<commit_message>
updated slides for lecture 2
</commit_message>
<xml_diff>
--- a/Second Meeting - Big O Notation - 09-06-2017/[Final]Algo-Club-Big-O-09-06-2017.pptx
+++ b/Second Meeting - Big O Notation - 09-06-2017/[Final]Algo-Club-Big-O-09-06-2017.pptx
@@ -6293,15 +6293,32 @@
         </p:nvSpPr>
         <p:spPr/>
         <p:txBody>
-          <a:bodyPr/>
+          <a:bodyPr>
+            <a:normAutofit fontScale="85000" lnSpcReduction="20000"/>
+          </a:bodyPr>
           <a:lstStyle/>
           <a:p>
             <a:pPr algn="ctr"/>
             <a:r>
               <a:rPr lang="en-US" dirty="0" smtClean="0"/>
-              <a:t>It’s a big deal</a:t>
-            </a:r>
+              <a:t>It’s a big </a:t>
+            </a:r>
+            <a:r>
+              <a:rPr lang="en-US" dirty="0" smtClean="0"/>
+              <a:t>deal</a:t>
+            </a:r>
+          </a:p>
+          <a:p>
+            <a:pPr algn="ctr"/>
             <a:endParaRPr lang="en-US" dirty="0"/>
+          </a:p>
+          <a:p>
+            <a:pPr algn="ctr"/>
+            <a:r>
+              <a:rPr lang="en-US" sz="1000" b="1" i="1" dirty="0" smtClean="0"/>
+              <a:t>Slides by Mo</a:t>
+            </a:r>
+            <a:endParaRPr lang="en-US" sz="1000" b="1" i="1" dirty="0"/>
           </a:p>
         </p:txBody>
       </p:sp>

</xml_diff>